<commit_message>
Update BPMN 2.0 - V20210110 par A.Want.pptx
</commit_message>
<xml_diff>
--- a/BPMN 2.0 - V20210110 par A.Want.pptx
+++ b/BPMN 2.0 - V20210110 par A.Want.pptx
@@ -8247,7 +8247,25 @@
                 </a:solidFill>
                 <a:latin typeface="Montserrat" pitchFamily="2"/>
               </a:rPr>
-              <a:t> » en ligne. C’est outil est gratuit et simple à prendre en  compte. Il peut aussi servir pour des projets collaboratifs. Vos projets peuvent être sauvé dans votre Google Drive.</a:t>
+              <a:t> » en ligne. C’est outil est gratuit et simple à prendre </a:t>
+            </a:r>
+            <a:r>
+              <a:rPr lang="fr-BE" sz="1600">
+                <a:solidFill>
+                  <a:srgbClr val="800000"/>
+                </a:solidFill>
+                <a:latin typeface="Montserrat" pitchFamily="2"/>
+              </a:rPr>
+              <a:t>en  main. </a:t>
+            </a:r>
+            <a:r>
+              <a:rPr lang="fr-BE" sz="1600" dirty="0">
+                <a:solidFill>
+                  <a:srgbClr val="800000"/>
+                </a:solidFill>
+                <a:latin typeface="Montserrat" pitchFamily="2"/>
+              </a:rPr>
+              <a:t>Il peut aussi servir pour des projets collaboratifs. Vos projets peuvent être sauvé dans votre Google Drive.</a:t>
             </a:r>
           </a:p>
           <a:p>

</xml_diff>